<commit_message>
finish propensity to buy
</commit_message>
<xml_diff>
--- a/Presentation2.pptx
+++ b/Presentation2.pptx
@@ -737,7 +737,7 @@
           <a:p>
             <a:fld id="{C66C8530-A62D-44D9-B569-A00AAE0B40F9}" type="datetimeFigureOut">
               <a:rPr lang="en-US" smtClean="0"/>
-              <a:t>5/12/2024</a:t>
+              <a:t>5/22/2024</a:t>
             </a:fld>
             <a:endParaRPr lang="en-US"/>
           </a:p>
@@ -935,7 +935,7 @@
           <a:p>
             <a:fld id="{C66C8530-A62D-44D9-B569-A00AAE0B40F9}" type="datetimeFigureOut">
               <a:rPr lang="en-US" smtClean="0"/>
-              <a:t>5/12/2024</a:t>
+              <a:t>5/22/2024</a:t>
             </a:fld>
             <a:endParaRPr lang="en-US"/>
           </a:p>
@@ -1143,7 +1143,7 @@
           <a:p>
             <a:fld id="{C66C8530-A62D-44D9-B569-A00AAE0B40F9}" type="datetimeFigureOut">
               <a:rPr lang="en-US" smtClean="0"/>
-              <a:t>5/12/2024</a:t>
+              <a:t>5/22/2024</a:t>
             </a:fld>
             <a:endParaRPr lang="en-US"/>
           </a:p>
@@ -1341,7 +1341,7 @@
           <a:p>
             <a:fld id="{C66C8530-A62D-44D9-B569-A00AAE0B40F9}" type="datetimeFigureOut">
               <a:rPr lang="en-US" smtClean="0"/>
-              <a:t>5/12/2024</a:t>
+              <a:t>5/22/2024</a:t>
             </a:fld>
             <a:endParaRPr lang="en-US"/>
           </a:p>
@@ -1616,7 +1616,7 @@
           <a:p>
             <a:fld id="{C66C8530-A62D-44D9-B569-A00AAE0B40F9}" type="datetimeFigureOut">
               <a:rPr lang="en-US" smtClean="0"/>
-              <a:t>5/12/2024</a:t>
+              <a:t>5/22/2024</a:t>
             </a:fld>
             <a:endParaRPr lang="en-US"/>
           </a:p>
@@ -1881,7 +1881,7 @@
           <a:p>
             <a:fld id="{C66C8530-A62D-44D9-B569-A00AAE0B40F9}" type="datetimeFigureOut">
               <a:rPr lang="en-US" smtClean="0"/>
-              <a:t>5/12/2024</a:t>
+              <a:t>5/22/2024</a:t>
             </a:fld>
             <a:endParaRPr lang="en-US"/>
           </a:p>
@@ -2293,7 +2293,7 @@
           <a:p>
             <a:fld id="{C66C8530-A62D-44D9-B569-A00AAE0B40F9}" type="datetimeFigureOut">
               <a:rPr lang="en-US" smtClean="0"/>
-              <a:t>5/12/2024</a:t>
+              <a:t>5/22/2024</a:t>
             </a:fld>
             <a:endParaRPr lang="en-US"/>
           </a:p>
@@ -2434,7 +2434,7 @@
           <a:p>
             <a:fld id="{C66C8530-A62D-44D9-B569-A00AAE0B40F9}" type="datetimeFigureOut">
               <a:rPr lang="en-US" smtClean="0"/>
-              <a:t>5/12/2024</a:t>
+              <a:t>5/22/2024</a:t>
             </a:fld>
             <a:endParaRPr lang="en-US"/>
           </a:p>
@@ -2547,7 +2547,7 @@
           <a:p>
             <a:fld id="{C66C8530-A62D-44D9-B569-A00AAE0B40F9}" type="datetimeFigureOut">
               <a:rPr lang="en-US" smtClean="0"/>
-              <a:t>5/12/2024</a:t>
+              <a:t>5/22/2024</a:t>
             </a:fld>
             <a:endParaRPr lang="en-US"/>
           </a:p>
@@ -2858,7 +2858,7 @@
           <a:p>
             <a:fld id="{C66C8530-A62D-44D9-B569-A00AAE0B40F9}" type="datetimeFigureOut">
               <a:rPr lang="en-US" smtClean="0"/>
-              <a:t>5/12/2024</a:t>
+              <a:t>5/22/2024</a:t>
             </a:fld>
             <a:endParaRPr lang="en-US"/>
           </a:p>
@@ -3146,7 +3146,7 @@
           <a:p>
             <a:fld id="{C66C8530-A62D-44D9-B569-A00AAE0B40F9}" type="datetimeFigureOut">
               <a:rPr lang="en-US" smtClean="0"/>
-              <a:t>5/12/2024</a:t>
+              <a:t>5/22/2024</a:t>
             </a:fld>
             <a:endParaRPr lang="en-US"/>
           </a:p>
@@ -3387,7 +3387,7 @@
           <a:p>
             <a:fld id="{C66C8530-A62D-44D9-B569-A00AAE0B40F9}" type="datetimeFigureOut">
               <a:rPr lang="en-US" smtClean="0"/>
-              <a:t>5/12/2024</a:t>
+              <a:t>5/22/2024</a:t>
             </a:fld>
             <a:endParaRPr lang="en-US"/>
           </a:p>
@@ -3886,153 +3886,6 @@
       </p:grpSpPr>
       <p:sp>
         <p:nvSpPr>
-          <p:cNvPr id="6" name="TextBox 5">
-            <a:extLst>
-              <a:ext uri="{FF2B5EF4-FFF2-40B4-BE49-F238E27FC236}">
-                <a16:creationId xmlns:a16="http://schemas.microsoft.com/office/drawing/2014/main" id="{BA10F946-E755-4757-9376-13C38F2AB5DB}"/>
-              </a:ext>
-            </a:extLst>
-          </p:cNvPr>
-          <p:cNvSpPr txBox="1"/>
-          <p:nvPr/>
-        </p:nvSpPr>
-        <p:spPr>
-          <a:xfrm>
-            <a:off x="3239193" y="3114205"/>
-            <a:ext cx="1905523" cy="369332"/>
-          </a:xfrm>
-          <a:prstGeom prst="rect">
-            <a:avLst/>
-          </a:prstGeom>
-        </p:spPr>
-        <p:style>
-          <a:lnRef idx="2">
-            <a:schemeClr val="dk1"/>
-          </a:lnRef>
-          <a:fillRef idx="1">
-            <a:schemeClr val="lt1"/>
-          </a:fillRef>
-          <a:effectRef idx="0">
-            <a:schemeClr val="dk1"/>
-          </a:effectRef>
-          <a:fontRef idx="minor">
-            <a:schemeClr val="dk1"/>
-          </a:fontRef>
-        </p:style>
-        <p:txBody>
-          <a:bodyPr wrap="square" rtlCol="0">
-            <a:spAutoFit/>
-          </a:bodyPr>
-          <a:lstStyle/>
-          <a:p>
-            <a:pPr algn="ctr"/>
-            <a:r>
-              <a:rPr lang="en-US" dirty="0"/>
-              <a:t>Propensity-to-buy</a:t>
-            </a:r>
-          </a:p>
-        </p:txBody>
-      </p:sp>
-      <p:sp>
-        <p:nvSpPr>
-          <p:cNvPr id="7" name="TextBox 6">
-            <a:extLst>
-              <a:ext uri="{FF2B5EF4-FFF2-40B4-BE49-F238E27FC236}">
-                <a16:creationId xmlns:a16="http://schemas.microsoft.com/office/drawing/2014/main" id="{0A258306-78E9-48B5-BB70-9B6EBFD0109F}"/>
-              </a:ext>
-            </a:extLst>
-          </p:cNvPr>
-          <p:cNvSpPr txBox="1"/>
-          <p:nvPr/>
-        </p:nvSpPr>
-        <p:spPr>
-          <a:xfrm>
-            <a:off x="1956376" y="2304395"/>
-            <a:ext cx="2599531" cy="369332"/>
-          </a:xfrm>
-          <a:prstGeom prst="rect">
-            <a:avLst/>
-          </a:prstGeom>
-        </p:spPr>
-        <p:style>
-          <a:lnRef idx="2">
-            <a:schemeClr val="dk1"/>
-          </a:lnRef>
-          <a:fillRef idx="1">
-            <a:schemeClr val="lt1"/>
-          </a:fillRef>
-          <a:effectRef idx="0">
-            <a:schemeClr val="dk1"/>
-          </a:effectRef>
-          <a:fontRef idx="minor">
-            <a:schemeClr val="dk1"/>
-          </a:fontRef>
-        </p:style>
-        <p:txBody>
-          <a:bodyPr wrap="square" rtlCol="0">
-            <a:spAutoFit/>
-          </a:bodyPr>
-          <a:lstStyle/>
-          <a:p>
-            <a:pPr algn="ctr"/>
-            <a:r>
-              <a:rPr lang="en-US" dirty="0"/>
-              <a:t>Recommendation system</a:t>
-            </a:r>
-          </a:p>
-        </p:txBody>
-      </p:sp>
-      <p:sp>
-        <p:nvSpPr>
-          <p:cNvPr id="12" name="TextBox 11">
-            <a:extLst>
-              <a:ext uri="{FF2B5EF4-FFF2-40B4-BE49-F238E27FC236}">
-                <a16:creationId xmlns:a16="http://schemas.microsoft.com/office/drawing/2014/main" id="{7A65D076-8F05-4D3A-8C3F-3AF0060A4CE9}"/>
-              </a:ext>
-            </a:extLst>
-          </p:cNvPr>
-          <p:cNvSpPr txBox="1"/>
-          <p:nvPr/>
-        </p:nvSpPr>
-        <p:spPr>
-          <a:xfrm>
-            <a:off x="2132175" y="3927861"/>
-            <a:ext cx="2516909" cy="369332"/>
-          </a:xfrm>
-          <a:prstGeom prst="rect">
-            <a:avLst/>
-          </a:prstGeom>
-        </p:spPr>
-        <p:style>
-          <a:lnRef idx="2">
-            <a:schemeClr val="dk1"/>
-          </a:lnRef>
-          <a:fillRef idx="1">
-            <a:schemeClr val="lt1"/>
-          </a:fillRef>
-          <a:effectRef idx="0">
-            <a:schemeClr val="dk1"/>
-          </a:effectRef>
-          <a:fontRef idx="minor">
-            <a:schemeClr val="dk1"/>
-          </a:fontRef>
-        </p:style>
-        <p:txBody>
-          <a:bodyPr wrap="square" rtlCol="0">
-            <a:spAutoFit/>
-          </a:bodyPr>
-          <a:lstStyle/>
-          <a:p>
-            <a:pPr algn="ctr"/>
-            <a:r>
-              <a:rPr lang="en-US" dirty="0"/>
-              <a:t>Market basket analysis</a:t>
-            </a:r>
-          </a:p>
-        </p:txBody>
-      </p:sp>
-      <p:sp>
-        <p:nvSpPr>
           <p:cNvPr id="31" name="TextBox 30">
             <a:extLst>
               <a:ext uri="{FF2B5EF4-FFF2-40B4-BE49-F238E27FC236}">
@@ -4202,7 +4055,7 @@
         </p:nvSpPr>
         <p:spPr>
           <a:xfrm>
-            <a:off x="7283102" y="2843743"/>
+            <a:off x="7302152" y="2694021"/>
             <a:ext cx="3089583" cy="369332"/>
           </a:xfrm>
           <a:custGeom>
@@ -5112,7 +4965,7 @@
         </p:nvSpPr>
         <p:spPr>
           <a:xfrm>
-            <a:off x="1076324" y="1269749"/>
+            <a:off x="1332720" y="1303274"/>
             <a:ext cx="1693916" cy="369332"/>
           </a:xfrm>
           <a:prstGeom prst="rect">
@@ -5127,7 +4980,7 @@
           <a:lstStyle/>
           <a:p>
             <a:r>
-              <a:rPr lang="en-US" dirty="0"/>
+              <a:rPr lang="en-US" i="1" dirty="0"/>
               <a:t>Product offering</a:t>
             </a:r>
           </a:p>
@@ -5147,7 +5000,7 @@
         </p:nvSpPr>
         <p:spPr>
           <a:xfrm>
-            <a:off x="8248650" y="1256282"/>
+            <a:off x="8344680" y="1283990"/>
             <a:ext cx="2514600" cy="369332"/>
           </a:xfrm>
           <a:prstGeom prst="rect">
@@ -5161,8 +5014,9 @@
           </a:bodyPr>
           <a:lstStyle/>
           <a:p>
-            <a:r>
-              <a:rPr lang="en-US" dirty="0"/>
+            <a:pPr algn="r"/>
+            <a:r>
+              <a:rPr lang="en-US" i="1" dirty="0"/>
               <a:t>Personalized messaging</a:t>
             </a:r>
           </a:p>
@@ -5455,7 +5309,7 @@
         </p:nvSpPr>
         <p:spPr>
           <a:xfrm>
-            <a:off x="8076100" y="6045524"/>
+            <a:off x="8002209" y="5842847"/>
             <a:ext cx="2857071" cy="369332"/>
           </a:xfrm>
           <a:prstGeom prst="rect">
@@ -5471,7 +5325,7 @@
           <a:p>
             <a:pPr algn="r"/>
             <a:r>
-              <a:rPr lang="en-US" dirty="0"/>
+              <a:rPr lang="en-US" i="1" dirty="0"/>
               <a:t>Preventing churn</a:t>
             </a:r>
           </a:p>
@@ -5754,7 +5608,7 @@
         </p:nvSpPr>
         <p:spPr>
           <a:xfrm>
-            <a:off x="2624731" y="6031809"/>
+            <a:off x="1332720" y="5842847"/>
             <a:ext cx="2071094" cy="369332"/>
           </a:xfrm>
           <a:prstGeom prst="rect">
@@ -5769,7 +5623,7 @@
           <a:lstStyle/>
           <a:p>
             <a:r>
-              <a:rPr lang="en-US" dirty="0"/>
+              <a:rPr lang="en-US" i="1" dirty="0"/>
               <a:t>Profit enhancement</a:t>
             </a:r>
           </a:p>
@@ -6085,10 +5939,7 @@
             </a:pathLst>
           </a:custGeom>
           <a:solidFill>
-            <a:schemeClr val="tx2">
-              <a:lumMod val="20000"/>
-              <a:lumOff val="80000"/>
-            </a:schemeClr>
+            <a:schemeClr val="accent2"/>
           </a:solidFill>
           <a:ln>
             <a:solidFill>
@@ -6132,6 +5983,474 @@
             <a:r>
               <a:rPr lang="en-US" i="1" dirty="0"/>
               <a:t>Customer segmentation</a:t>
+            </a:r>
+          </a:p>
+        </p:txBody>
+      </p:sp>
+      <p:sp>
+        <p:nvSpPr>
+          <p:cNvPr id="19" name="TextBox 18">
+            <a:extLst>
+              <a:ext uri="{FF2B5EF4-FFF2-40B4-BE49-F238E27FC236}">
+                <a16:creationId xmlns:a16="http://schemas.microsoft.com/office/drawing/2014/main" id="{7F04644A-F5D6-45A1-9890-2D8699FBB62F}"/>
+              </a:ext>
+            </a:extLst>
+          </p:cNvPr>
+          <p:cNvSpPr txBox="1"/>
+          <p:nvPr/>
+        </p:nvSpPr>
+        <p:spPr>
+          <a:xfrm>
+            <a:off x="2204541" y="3180876"/>
+            <a:ext cx="3075709" cy="369332"/>
+          </a:xfrm>
+          <a:custGeom>
+            <a:avLst/>
+            <a:gdLst>
+              <a:gd name="connsiteX0" fmla="*/ 0 w 3075709"/>
+              <a:gd name="connsiteY0" fmla="*/ 0 h 369332"/>
+              <a:gd name="connsiteX1" fmla="*/ 3075709 w 3075709"/>
+              <a:gd name="connsiteY1" fmla="*/ 0 h 369332"/>
+              <a:gd name="connsiteX2" fmla="*/ 3075709 w 3075709"/>
+              <a:gd name="connsiteY2" fmla="*/ 369332 h 369332"/>
+              <a:gd name="connsiteX3" fmla="*/ 0 w 3075709"/>
+              <a:gd name="connsiteY3" fmla="*/ 369332 h 369332"/>
+              <a:gd name="connsiteX4" fmla="*/ 0 w 3075709"/>
+              <a:gd name="connsiteY4" fmla="*/ 0 h 369332"/>
+            </a:gdLst>
+            <a:ahLst/>
+            <a:cxnLst>
+              <a:cxn ang="0">
+                <a:pos x="connsiteX0" y="connsiteY0"/>
+              </a:cxn>
+              <a:cxn ang="0">
+                <a:pos x="connsiteX1" y="connsiteY1"/>
+              </a:cxn>
+              <a:cxn ang="0">
+                <a:pos x="connsiteX2" y="connsiteY2"/>
+              </a:cxn>
+              <a:cxn ang="0">
+                <a:pos x="connsiteX3" y="connsiteY3"/>
+              </a:cxn>
+              <a:cxn ang="0">
+                <a:pos x="connsiteX4" y="connsiteY4"/>
+              </a:cxn>
+            </a:cxnLst>
+            <a:rect l="l" t="t" r="r" b="b"/>
+            <a:pathLst>
+              <a:path w="3075709" h="369332" fill="none" extrusionOk="0">
+                <a:moveTo>
+                  <a:pt x="0" y="0"/>
+                </a:moveTo>
+                <a:cubicBezTo>
+                  <a:pt x="491535" y="-49533"/>
+                  <a:pt x="1682084" y="-14809"/>
+                  <a:pt x="3075709" y="0"/>
+                </a:cubicBezTo>
+                <a:cubicBezTo>
+                  <a:pt x="3065251" y="136842"/>
+                  <a:pt x="3048486" y="302669"/>
+                  <a:pt x="3075709" y="369332"/>
+                </a:cubicBezTo>
+                <a:cubicBezTo>
+                  <a:pt x="1738003" y="321101"/>
+                  <a:pt x="1400301" y="453787"/>
+                  <a:pt x="0" y="369332"/>
+                </a:cubicBezTo>
+                <a:cubicBezTo>
+                  <a:pt x="-11636" y="186919"/>
+                  <a:pt x="-6040" y="115751"/>
+                  <a:pt x="0" y="0"/>
+                </a:cubicBezTo>
+                <a:close/>
+              </a:path>
+              <a:path w="3075709" h="369332" stroke="0" extrusionOk="0">
+                <a:moveTo>
+                  <a:pt x="0" y="0"/>
+                </a:moveTo>
+                <a:cubicBezTo>
+                  <a:pt x="1341565" y="118645"/>
+                  <a:pt x="1604952" y="116012"/>
+                  <a:pt x="3075709" y="0"/>
+                </a:cubicBezTo>
+                <a:cubicBezTo>
+                  <a:pt x="3052905" y="167616"/>
+                  <a:pt x="3073649" y="247698"/>
+                  <a:pt x="3075709" y="369332"/>
+                </a:cubicBezTo>
+                <a:cubicBezTo>
+                  <a:pt x="2224901" y="503932"/>
+                  <a:pt x="932645" y="212136"/>
+                  <a:pt x="0" y="369332"/>
+                </a:cubicBezTo>
+                <a:cubicBezTo>
+                  <a:pt x="19812" y="326466"/>
+                  <a:pt x="15727" y="93631"/>
+                  <a:pt x="0" y="0"/>
+                </a:cubicBezTo>
+                <a:close/>
+              </a:path>
+            </a:pathLst>
+          </a:custGeom>
+          <a:solidFill>
+            <a:schemeClr val="accent2"/>
+          </a:solidFill>
+          <a:ln>
+            <a:solidFill>
+              <a:schemeClr val="dk1"/>
+            </a:solidFill>
+            <a:extLst>
+              <a:ext uri="{C807C97D-BFC1-408E-A445-0C87EB9F89A2}">
+                <ask:lineSketchStyleProps xmlns:ask="http://schemas.microsoft.com/office/drawing/2018/sketchyshapes" sd="1219033472">
+                  <a:prstGeom prst="rect">
+                    <a:avLst/>
+                  </a:prstGeom>
+                  <ask:type>
+                    <ask:lineSketchCurved/>
+                  </ask:type>
+                </ask:lineSketchStyleProps>
+              </a:ext>
+            </a:extLst>
+          </a:ln>
+        </p:spPr>
+        <p:style>
+          <a:lnRef idx="2">
+            <a:schemeClr val="dk1"/>
+          </a:lnRef>
+          <a:fillRef idx="1">
+            <a:schemeClr val="lt1"/>
+          </a:fillRef>
+          <a:effectRef idx="0">
+            <a:schemeClr val="dk1"/>
+          </a:effectRef>
+          <a:fontRef idx="minor">
+            <a:schemeClr val="dk1"/>
+          </a:fontRef>
+        </p:style>
+        <p:txBody>
+          <a:bodyPr wrap="square" rtlCol="0">
+            <a:spAutoFit/>
+          </a:bodyPr>
+          <a:lstStyle/>
+          <a:p>
+            <a:pPr algn="ctr"/>
+            <a:r>
+              <a:rPr lang="en-US" i="1" dirty="0"/>
+              <a:t>Propensity-to buy (PTB) model</a:t>
+            </a:r>
+          </a:p>
+        </p:txBody>
+      </p:sp>
+      <p:sp>
+        <p:nvSpPr>
+          <p:cNvPr id="20" name="TextBox 19">
+            <a:extLst>
+              <a:ext uri="{FF2B5EF4-FFF2-40B4-BE49-F238E27FC236}">
+                <a16:creationId xmlns:a16="http://schemas.microsoft.com/office/drawing/2014/main" id="{3AD613F6-2C8F-4ED2-93E3-39E861546527}"/>
+              </a:ext>
+            </a:extLst>
+          </p:cNvPr>
+          <p:cNvSpPr txBox="1"/>
+          <p:nvPr/>
+        </p:nvSpPr>
+        <p:spPr>
+          <a:xfrm>
+            <a:off x="1791877" y="4053603"/>
+            <a:ext cx="2424279" cy="369332"/>
+          </a:xfrm>
+          <a:custGeom>
+            <a:avLst/>
+            <a:gdLst>
+              <a:gd name="connsiteX0" fmla="*/ 0 w 2424279"/>
+              <a:gd name="connsiteY0" fmla="*/ 0 h 369332"/>
+              <a:gd name="connsiteX1" fmla="*/ 2424279 w 2424279"/>
+              <a:gd name="connsiteY1" fmla="*/ 0 h 369332"/>
+              <a:gd name="connsiteX2" fmla="*/ 2424279 w 2424279"/>
+              <a:gd name="connsiteY2" fmla="*/ 369332 h 369332"/>
+              <a:gd name="connsiteX3" fmla="*/ 0 w 2424279"/>
+              <a:gd name="connsiteY3" fmla="*/ 369332 h 369332"/>
+              <a:gd name="connsiteX4" fmla="*/ 0 w 2424279"/>
+              <a:gd name="connsiteY4" fmla="*/ 0 h 369332"/>
+            </a:gdLst>
+            <a:ahLst/>
+            <a:cxnLst>
+              <a:cxn ang="0">
+                <a:pos x="connsiteX0" y="connsiteY0"/>
+              </a:cxn>
+              <a:cxn ang="0">
+                <a:pos x="connsiteX1" y="connsiteY1"/>
+              </a:cxn>
+              <a:cxn ang="0">
+                <a:pos x="connsiteX2" y="connsiteY2"/>
+              </a:cxn>
+              <a:cxn ang="0">
+                <a:pos x="connsiteX3" y="connsiteY3"/>
+              </a:cxn>
+              <a:cxn ang="0">
+                <a:pos x="connsiteX4" y="connsiteY4"/>
+              </a:cxn>
+            </a:cxnLst>
+            <a:rect l="l" t="t" r="r" b="b"/>
+            <a:pathLst>
+              <a:path w="2424279" h="369332" fill="none" extrusionOk="0">
+                <a:moveTo>
+                  <a:pt x="0" y="0"/>
+                </a:moveTo>
+                <a:cubicBezTo>
+                  <a:pt x="1204598" y="-49533"/>
+                  <a:pt x="1453411" y="-14809"/>
+                  <a:pt x="2424279" y="0"/>
+                </a:cubicBezTo>
+                <a:cubicBezTo>
+                  <a:pt x="2413821" y="136842"/>
+                  <a:pt x="2397056" y="302669"/>
+                  <a:pt x="2424279" y="369332"/>
+                </a:cubicBezTo>
+                <a:cubicBezTo>
+                  <a:pt x="1306499" y="321101"/>
+                  <a:pt x="1190886" y="453787"/>
+                  <a:pt x="0" y="369332"/>
+                </a:cubicBezTo>
+                <a:cubicBezTo>
+                  <a:pt x="-11636" y="186919"/>
+                  <a:pt x="-6040" y="115751"/>
+                  <a:pt x="0" y="0"/>
+                </a:cubicBezTo>
+                <a:close/>
+              </a:path>
+              <a:path w="2424279" h="369332" stroke="0" extrusionOk="0">
+                <a:moveTo>
+                  <a:pt x="0" y="0"/>
+                </a:moveTo>
+                <a:cubicBezTo>
+                  <a:pt x="1079679" y="118645"/>
+                  <a:pt x="1269612" y="116012"/>
+                  <a:pt x="2424279" y="0"/>
+                </a:cubicBezTo>
+                <a:cubicBezTo>
+                  <a:pt x="2401475" y="167616"/>
+                  <a:pt x="2422219" y="247698"/>
+                  <a:pt x="2424279" y="369332"/>
+                </a:cubicBezTo>
+                <a:cubicBezTo>
+                  <a:pt x="1461995" y="503932"/>
+                  <a:pt x="245818" y="212136"/>
+                  <a:pt x="0" y="369332"/>
+                </a:cubicBezTo>
+                <a:cubicBezTo>
+                  <a:pt x="19812" y="326466"/>
+                  <a:pt x="15727" y="93631"/>
+                  <a:pt x="0" y="0"/>
+                </a:cubicBezTo>
+                <a:close/>
+              </a:path>
+            </a:pathLst>
+          </a:custGeom>
+          <a:solidFill>
+            <a:schemeClr val="tx2">
+              <a:lumMod val="20000"/>
+              <a:lumOff val="80000"/>
+            </a:schemeClr>
+          </a:solidFill>
+          <a:ln>
+            <a:solidFill>
+              <a:schemeClr val="dk1"/>
+            </a:solidFill>
+            <a:extLst>
+              <a:ext uri="{C807C97D-BFC1-408E-A445-0C87EB9F89A2}">
+                <ask:lineSketchStyleProps xmlns:ask="http://schemas.microsoft.com/office/drawing/2018/sketchyshapes" sd="1219033472">
+                  <a:prstGeom prst="rect">
+                    <a:avLst/>
+                  </a:prstGeom>
+                  <ask:type>
+                    <ask:lineSketchCurved/>
+                  </ask:type>
+                </ask:lineSketchStyleProps>
+              </a:ext>
+            </a:extLst>
+          </a:ln>
+        </p:spPr>
+        <p:style>
+          <a:lnRef idx="2">
+            <a:schemeClr val="dk1"/>
+          </a:lnRef>
+          <a:fillRef idx="1">
+            <a:schemeClr val="lt1"/>
+          </a:fillRef>
+          <a:effectRef idx="0">
+            <a:schemeClr val="dk1"/>
+          </a:effectRef>
+          <a:fontRef idx="minor">
+            <a:schemeClr val="dk1"/>
+          </a:fontRef>
+        </p:style>
+        <p:txBody>
+          <a:bodyPr wrap="square" rtlCol="0">
+            <a:spAutoFit/>
+          </a:bodyPr>
+          <a:lstStyle/>
+          <a:p>
+            <a:pPr algn="ctr"/>
+            <a:r>
+              <a:rPr lang="en-US" dirty="0"/>
+              <a:t>Market basket analysis</a:t>
+            </a:r>
+          </a:p>
+        </p:txBody>
+      </p:sp>
+      <p:sp>
+        <p:nvSpPr>
+          <p:cNvPr id="21" name="TextBox 20">
+            <a:extLst>
+              <a:ext uri="{FF2B5EF4-FFF2-40B4-BE49-F238E27FC236}">
+                <a16:creationId xmlns:a16="http://schemas.microsoft.com/office/drawing/2014/main" id="{98CAFFCB-4D94-4BC0-A12E-2547EC5CA322}"/>
+              </a:ext>
+            </a:extLst>
+          </p:cNvPr>
+          <p:cNvSpPr txBox="1"/>
+          <p:nvPr/>
+        </p:nvSpPr>
+        <p:spPr>
+          <a:xfrm>
+            <a:off x="1791877" y="2324689"/>
+            <a:ext cx="2704402" cy="369332"/>
+          </a:xfrm>
+          <a:custGeom>
+            <a:avLst/>
+            <a:gdLst>
+              <a:gd name="connsiteX0" fmla="*/ 0 w 2704402"/>
+              <a:gd name="connsiteY0" fmla="*/ 0 h 369332"/>
+              <a:gd name="connsiteX1" fmla="*/ 2704402 w 2704402"/>
+              <a:gd name="connsiteY1" fmla="*/ 0 h 369332"/>
+              <a:gd name="connsiteX2" fmla="*/ 2704402 w 2704402"/>
+              <a:gd name="connsiteY2" fmla="*/ 369332 h 369332"/>
+              <a:gd name="connsiteX3" fmla="*/ 0 w 2704402"/>
+              <a:gd name="connsiteY3" fmla="*/ 369332 h 369332"/>
+              <a:gd name="connsiteX4" fmla="*/ 0 w 2704402"/>
+              <a:gd name="connsiteY4" fmla="*/ 0 h 369332"/>
+            </a:gdLst>
+            <a:ahLst/>
+            <a:cxnLst>
+              <a:cxn ang="0">
+                <a:pos x="connsiteX0" y="connsiteY0"/>
+              </a:cxn>
+              <a:cxn ang="0">
+                <a:pos x="connsiteX1" y="connsiteY1"/>
+              </a:cxn>
+              <a:cxn ang="0">
+                <a:pos x="connsiteX2" y="connsiteY2"/>
+              </a:cxn>
+              <a:cxn ang="0">
+                <a:pos x="connsiteX3" y="connsiteY3"/>
+              </a:cxn>
+              <a:cxn ang="0">
+                <a:pos x="connsiteX4" y="connsiteY4"/>
+              </a:cxn>
+            </a:cxnLst>
+            <a:rect l="l" t="t" r="r" b="b"/>
+            <a:pathLst>
+              <a:path w="2704402" h="369332" fill="none" extrusionOk="0">
+                <a:moveTo>
+                  <a:pt x="0" y="0"/>
+                </a:moveTo>
+                <a:cubicBezTo>
+                  <a:pt x="1252785" y="-49533"/>
+                  <a:pt x="2001181" y="-14809"/>
+                  <a:pt x="2704402" y="0"/>
+                </a:cubicBezTo>
+                <a:cubicBezTo>
+                  <a:pt x="2693944" y="136842"/>
+                  <a:pt x="2677179" y="302669"/>
+                  <a:pt x="2704402" y="369332"/>
+                </a:cubicBezTo>
+                <a:cubicBezTo>
+                  <a:pt x="2274309" y="321101"/>
+                  <a:pt x="286227" y="453787"/>
+                  <a:pt x="0" y="369332"/>
+                </a:cubicBezTo>
+                <a:cubicBezTo>
+                  <a:pt x="-11636" y="186919"/>
+                  <a:pt x="-6040" y="115751"/>
+                  <a:pt x="0" y="0"/>
+                </a:cubicBezTo>
+                <a:close/>
+              </a:path>
+              <a:path w="2704402" h="369332" stroke="0" extrusionOk="0">
+                <a:moveTo>
+                  <a:pt x="0" y="0"/>
+                </a:moveTo>
+                <a:cubicBezTo>
+                  <a:pt x="813189" y="118645"/>
+                  <a:pt x="1453007" y="116012"/>
+                  <a:pt x="2704402" y="0"/>
+                </a:cubicBezTo>
+                <a:cubicBezTo>
+                  <a:pt x="2681598" y="167616"/>
+                  <a:pt x="2702342" y="247698"/>
+                  <a:pt x="2704402" y="369332"/>
+                </a:cubicBezTo>
+                <a:cubicBezTo>
+                  <a:pt x="1727294" y="503932"/>
+                  <a:pt x="960308" y="212136"/>
+                  <a:pt x="0" y="369332"/>
+                </a:cubicBezTo>
+                <a:cubicBezTo>
+                  <a:pt x="19812" y="326466"/>
+                  <a:pt x="15727" y="93631"/>
+                  <a:pt x="0" y="0"/>
+                </a:cubicBezTo>
+                <a:close/>
+              </a:path>
+            </a:pathLst>
+          </a:custGeom>
+          <a:solidFill>
+            <a:schemeClr val="tx2">
+              <a:lumMod val="20000"/>
+              <a:lumOff val="80000"/>
+            </a:schemeClr>
+          </a:solidFill>
+          <a:ln>
+            <a:solidFill>
+              <a:schemeClr val="dk1"/>
+            </a:solidFill>
+            <a:extLst>
+              <a:ext uri="{C807C97D-BFC1-408E-A445-0C87EB9F89A2}">
+                <ask:lineSketchStyleProps xmlns:ask="http://schemas.microsoft.com/office/drawing/2018/sketchyshapes" sd="1219033472">
+                  <a:prstGeom prst="rect">
+                    <a:avLst/>
+                  </a:prstGeom>
+                  <ask:type>
+                    <ask:lineSketchCurved/>
+                  </ask:type>
+                </ask:lineSketchStyleProps>
+              </a:ext>
+            </a:extLst>
+          </a:ln>
+        </p:spPr>
+        <p:style>
+          <a:lnRef idx="2">
+            <a:schemeClr val="dk1"/>
+          </a:lnRef>
+          <a:fillRef idx="1">
+            <a:schemeClr val="lt1"/>
+          </a:fillRef>
+          <a:effectRef idx="0">
+            <a:schemeClr val="dk1"/>
+          </a:effectRef>
+          <a:fontRef idx="minor">
+            <a:schemeClr val="dk1"/>
+          </a:fontRef>
+        </p:style>
+        <p:txBody>
+          <a:bodyPr wrap="square" rtlCol="0">
+            <a:spAutoFit/>
+          </a:bodyPr>
+          <a:lstStyle/>
+          <a:p>
+            <a:pPr algn="ctr"/>
+            <a:r>
+              <a:rPr lang="en-US" dirty="0"/>
+              <a:t>Recommendation system</a:t>
             </a:r>
           </a:p>
         </p:txBody>

</xml_diff>